<commit_message>
update for latest workshop sandisk
</commit_message>
<xml_diff>
--- a/slides/14 - Model Optimization and Evaluation.pptx
+++ b/slides/14 - Model Optimization and Evaluation.pptx
@@ -5,10 +5,10 @@
     <p:sldMasterId id="2147483694" r:id="rId1"/>
   </p:sldMasterIdLst>
   <p:notesMasterIdLst>
-    <p:notesMasterId r:id="rId37"/>
+    <p:notesMasterId r:id="rId38"/>
   </p:notesMasterIdLst>
   <p:handoutMasterIdLst>
-    <p:handoutMasterId r:id="rId38"/>
+    <p:handoutMasterId r:id="rId39"/>
   </p:handoutMasterIdLst>
   <p:sldIdLst>
     <p:sldId id="260" r:id="rId2"/>
@@ -37,15 +37,16 @@
     <p:sldId id="338" r:id="rId25"/>
     <p:sldId id="285" r:id="rId26"/>
     <p:sldId id="340" r:id="rId27"/>
-    <p:sldId id="366" r:id="rId28"/>
-    <p:sldId id="365" r:id="rId29"/>
-    <p:sldId id="341" r:id="rId30"/>
-    <p:sldId id="356" r:id="rId31"/>
-    <p:sldId id="355" r:id="rId32"/>
-    <p:sldId id="346" r:id="rId33"/>
-    <p:sldId id="327" r:id="rId34"/>
-    <p:sldId id="353" r:id="rId35"/>
-    <p:sldId id="354" r:id="rId36"/>
+    <p:sldId id="367" r:id="rId28"/>
+    <p:sldId id="366" r:id="rId29"/>
+    <p:sldId id="365" r:id="rId30"/>
+    <p:sldId id="341" r:id="rId31"/>
+    <p:sldId id="356" r:id="rId32"/>
+    <p:sldId id="355" r:id="rId33"/>
+    <p:sldId id="346" r:id="rId34"/>
+    <p:sldId id="327" r:id="rId35"/>
+    <p:sldId id="353" r:id="rId36"/>
+    <p:sldId id="354" r:id="rId37"/>
   </p:sldIdLst>
   <p:sldSz cx="12192000" cy="6858000"/>
   <p:notesSz cx="6858000" cy="9144000"/>
@@ -249,7 +250,7 @@
           <a:p>
             <a:fld id="{A1347FCD-4104-406A-A39B-5BEB4653AB02}" type="datetimeFigureOut">
               <a:rPr lang="en-US" smtClean="0"/>
-              <a:t>6/18/2023</a:t>
+              <a:t>6/20/2023</a:t>
             </a:fld>
             <a:endParaRPr lang="en-US"/>
           </a:p>
@@ -426,7 +427,7 @@
           <a:p>
             <a:fld id="{7E52F6ED-E1D1-40C7-A246-F65D423A4F17}" type="datetimeFigureOut">
               <a:rPr lang="en-US" smtClean="0"/>
-              <a:t>6/18/2023</a:t>
+              <a:t>6/20/2023</a:t>
             </a:fld>
             <a:endParaRPr lang="en-US"/>
           </a:p>
@@ -1012,7 +1013,7 @@
           <a:p>
             <a:fld id="{8546575E-568F-43AC-B90E-124DEB9485D9}" type="datetime1">
               <a:rPr lang="en-US" smtClean="0"/>
-              <a:t>6/18/2023</a:t>
+              <a:t>6/20/2023</a:t>
             </a:fld>
             <a:endParaRPr lang="en-US"/>
           </a:p>
@@ -1220,7 +1221,7 @@
           <a:p>
             <a:fld id="{C3357083-4168-4D1F-9A76-361D4E1744C2}" type="datetime1">
               <a:rPr lang="en-US" smtClean="0"/>
-              <a:t>6/18/2023</a:t>
+              <a:t>6/20/2023</a:t>
             </a:fld>
             <a:endParaRPr lang="en-US"/>
           </a:p>
@@ -2313,7 +2314,7 @@
           <a:p>
             <a:fld id="{4A09810F-BB01-431F-A36B-01A80F00F9A2}" type="datetime1">
               <a:rPr lang="en-US" smtClean="0"/>
-              <a:t>6/18/2023</a:t>
+              <a:t>6/20/2023</a:t>
             </a:fld>
             <a:endParaRPr lang="en-US"/>
           </a:p>
@@ -2788,7 +2789,7 @@
           <a:p>
             <a:fld id="{99B6BA1C-0431-441A-9684-27D3820DDA76}" type="datetime1">
               <a:rPr lang="en-US" smtClean="0"/>
-              <a:t>6/18/2023</a:t>
+              <a:t>6/20/2023</a:t>
             </a:fld>
             <a:endParaRPr lang="en-US"/>
           </a:p>
@@ -3076,7 +3077,7 @@
           <a:p>
             <a:fld id="{911AD90E-AE50-48B2-954D-3C61712566FC}" type="datetime1">
               <a:rPr lang="en-US" smtClean="0"/>
-              <a:t>6/18/2023</a:t>
+              <a:t>6/20/2023</a:t>
             </a:fld>
             <a:endParaRPr lang="en-US"/>
           </a:p>
@@ -3317,7 +3318,7 @@
           <a:p>
             <a:fld id="{BC208437-3005-4AE1-B600-AE18E1986B0F}" type="datetime1">
               <a:rPr lang="en-US" smtClean="0"/>
-              <a:t>6/18/2023</a:t>
+              <a:t>6/20/2023</a:t>
             </a:fld>
             <a:endParaRPr lang="en-US"/>
           </a:p>
@@ -8344,7 +8345,7 @@
           <p:cNvPr id="2" name="Title 1">
             <a:extLst>
               <a:ext uri="{FF2B5EF4-FFF2-40B4-BE49-F238E27FC236}">
-                <a16:creationId xmlns:a16="http://schemas.microsoft.com/office/drawing/2014/main" id="{2769ED0D-A3C8-4D96-A14D-9E7BAE2C76A5}"/>
+                <a16:creationId xmlns:a16="http://schemas.microsoft.com/office/drawing/2014/main" id="{2C9D5D48-8780-F4DA-E9D1-57BF0D30ABFA}"/>
               </a:ext>
             </a:extLst>
           </p:cNvPr>
@@ -8357,21 +8358,18 @@
         </p:nvSpPr>
         <p:spPr>
           <a:xfrm>
-            <a:off x="424544" y="172620"/>
-            <a:ext cx="11710850" cy="1394923"/>
-          </a:xfrm>
-        </p:spPr>
-        <p:txBody>
-          <a:bodyPr>
-            <a:normAutofit fontScale="90000"/>
-          </a:bodyPr>
-          <a:lstStyle/>
-          <a:p>
-            <a:r>
-              <a:rPr lang="en-US" dirty="0"/>
-              <a:t>Hyperparameters  vs model parameters</a:t>
-            </a:r>
-            <a:endParaRPr lang="en-MY" dirty="0"/>
+            <a:off x="595008" y="0"/>
+            <a:ext cx="10515600" cy="1325563"/>
+          </a:xfrm>
+        </p:spPr>
+        <p:txBody>
+          <a:bodyPr/>
+          <a:lstStyle/>
+          <a:p>
+            <a:r>
+              <a:rPr lang="en-MY" dirty="0"/>
+              <a:t>Hyperparameters</a:t>
+            </a:r>
           </a:p>
         </p:txBody>
       </p:sp>
@@ -8380,7 +8378,7 @@
           <p:cNvPr id="3" name="Slide Number Placeholder 2">
             <a:extLst>
               <a:ext uri="{FF2B5EF4-FFF2-40B4-BE49-F238E27FC236}">
-                <a16:creationId xmlns:a16="http://schemas.microsoft.com/office/drawing/2014/main" id="{781243E5-8F0B-41FB-8CFC-20BA05B1D544}"/>
+                <a16:creationId xmlns:a16="http://schemas.microsoft.com/office/drawing/2014/main" id="{ECDECF9B-20C9-120A-708E-4CA4C4CED7A6}"/>
               </a:ext>
             </a:extLst>
           </p:cNvPr>
@@ -8406,10 +8404,10 @@
       </p:sp>
       <p:pic>
         <p:nvPicPr>
-          <p:cNvPr id="6" name="Picture 5" descr="A picture containing text, businesscard, screenshot, font&#10;&#10;Description automatically generated">
-            <a:extLst>
-              <a:ext uri="{FF2B5EF4-FFF2-40B4-BE49-F238E27FC236}">
-                <a16:creationId xmlns:a16="http://schemas.microsoft.com/office/drawing/2014/main" id="{6788BCA0-A14A-4D8D-9F02-32616FF2B25B}"/>
+          <p:cNvPr id="5" name="Picture 4">
+            <a:extLst>
+              <a:ext uri="{FF2B5EF4-FFF2-40B4-BE49-F238E27FC236}">
+                <a16:creationId xmlns:a16="http://schemas.microsoft.com/office/drawing/2014/main" id="{BAD5EF7E-FEA5-6BB5-301E-030175160011}"/>
               </a:ext>
             </a:extLst>
           </p:cNvPr>
@@ -8432,8 +8430,44 @@
         </p:blipFill>
         <p:spPr>
           <a:xfrm>
-            <a:off x="989511" y="1362726"/>
-            <a:ext cx="10212977" cy="5176186"/>
+            <a:off x="1731181" y="1171754"/>
+            <a:ext cx="8103484" cy="1681856"/>
+          </a:xfrm>
+          <a:prstGeom prst="rect">
+            <a:avLst/>
+          </a:prstGeom>
+        </p:spPr>
+      </p:pic>
+      <p:pic>
+        <p:nvPicPr>
+          <p:cNvPr id="7" name="Picture 6">
+            <a:extLst>
+              <a:ext uri="{FF2B5EF4-FFF2-40B4-BE49-F238E27FC236}">
+                <a16:creationId xmlns:a16="http://schemas.microsoft.com/office/drawing/2014/main" id="{D013CCEC-3021-F98B-D9C0-BBCF7EC98914}"/>
+              </a:ext>
+            </a:extLst>
+          </p:cNvPr>
+          <p:cNvPicPr>
+            <a:picLocks noChangeAspect="1"/>
+          </p:cNvPicPr>
+          <p:nvPr/>
+        </p:nvPicPr>
+        <p:blipFill>
+          <a:blip r:embed="rId3">
+            <a:extLst>
+              <a:ext uri="{28A0092B-C50C-407E-A947-70E740481C1C}">
+                <a14:useLocalDpi xmlns:a14="http://schemas.microsoft.com/office/drawing/2010/main" val="0"/>
+              </a:ext>
+            </a:extLst>
+          </a:blip>
+          <a:stretch>
+            <a:fillRect/>
+          </a:stretch>
+        </p:blipFill>
+        <p:spPr>
+          <a:xfrm>
+            <a:off x="2645923" y="2918576"/>
+            <a:ext cx="6350561" cy="4011466"/>
           </a:xfrm>
           <a:prstGeom prst="rect">
             <a:avLst/>
@@ -8443,7 +8477,7 @@
     </p:spTree>
     <p:extLst>
       <p:ext uri="{BB962C8B-B14F-4D97-AF65-F5344CB8AC3E}">
-        <p14:creationId xmlns:p14="http://schemas.microsoft.com/office/powerpoint/2010/main" val="756669190"/>
+        <p14:creationId xmlns:p14="http://schemas.microsoft.com/office/powerpoint/2010/main" val="1797847522"/>
       </p:ext>
     </p:extLst>
   </p:cSld>
@@ -8488,17 +8522,19 @@
         </p:nvSpPr>
         <p:spPr>
           <a:xfrm>
-            <a:off x="988421" y="172620"/>
-            <a:ext cx="10515600" cy="1325563"/>
-          </a:xfrm>
-        </p:spPr>
-        <p:txBody>
-          <a:bodyPr/>
+            <a:off x="424544" y="172620"/>
+            <a:ext cx="11710850" cy="1394923"/>
+          </a:xfrm>
+        </p:spPr>
+        <p:txBody>
+          <a:bodyPr>
+            <a:normAutofit fontScale="90000"/>
+          </a:bodyPr>
           <a:lstStyle/>
           <a:p>
             <a:r>
               <a:rPr lang="en-US" dirty="0"/>
-              <a:t>Hyperparameter tuning</a:t>
+              <a:t>Hyperparameters  vs model parameters</a:t>
             </a:r>
             <a:endParaRPr lang="en-MY" dirty="0"/>
           </a:p>
@@ -8535,10 +8571,10 @@
       </p:sp>
       <p:pic>
         <p:nvPicPr>
-          <p:cNvPr id="5" name="Picture 4">
-            <a:extLst>
-              <a:ext uri="{FF2B5EF4-FFF2-40B4-BE49-F238E27FC236}">
-                <a16:creationId xmlns:a16="http://schemas.microsoft.com/office/drawing/2014/main" id="{45813A8D-48DC-407E-BFAC-A1BE06780D0A}"/>
+          <p:cNvPr id="6" name="Picture 5" descr="A picture containing text, businesscard, screenshot, font&#10;&#10;Description automatically generated">
+            <a:extLst>
+              <a:ext uri="{FF2B5EF4-FFF2-40B4-BE49-F238E27FC236}">
+                <a16:creationId xmlns:a16="http://schemas.microsoft.com/office/drawing/2014/main" id="{6788BCA0-A14A-4D8D-9F02-32616FF2B25B}"/>
               </a:ext>
             </a:extLst>
           </p:cNvPr>
@@ -8561,8 +8597,8 @@
         </p:blipFill>
         <p:spPr>
           <a:xfrm>
-            <a:off x="1763486" y="1336159"/>
-            <a:ext cx="7834103" cy="5114828"/>
+            <a:off x="989511" y="1362726"/>
+            <a:ext cx="10212977" cy="5176186"/>
           </a:xfrm>
           <a:prstGeom prst="rect">
             <a:avLst/>
@@ -8572,7 +8608,7 @@
     </p:spTree>
     <p:extLst>
       <p:ext uri="{BB962C8B-B14F-4D97-AF65-F5344CB8AC3E}">
-        <p14:creationId xmlns:p14="http://schemas.microsoft.com/office/powerpoint/2010/main" val="1226819991"/>
+        <p14:creationId xmlns:p14="http://schemas.microsoft.com/office/powerpoint/2010/main" val="756669190"/>
       </p:ext>
     </p:extLst>
   </p:cSld>
@@ -8664,10 +8700,10 @@
       </p:sp>
       <p:pic>
         <p:nvPicPr>
-          <p:cNvPr id="6" name="Picture 5" descr="A picture containing text, diagram, screenshot, plan&#10;&#10;Description automatically generated">
-            <a:extLst>
-              <a:ext uri="{FF2B5EF4-FFF2-40B4-BE49-F238E27FC236}">
-                <a16:creationId xmlns:a16="http://schemas.microsoft.com/office/drawing/2014/main" id="{06E9887F-9E67-4E7C-98BA-636E711EBB66}"/>
+          <p:cNvPr id="5" name="Picture 4">
+            <a:extLst>
+              <a:ext uri="{FF2B5EF4-FFF2-40B4-BE49-F238E27FC236}">
+                <a16:creationId xmlns:a16="http://schemas.microsoft.com/office/drawing/2014/main" id="{45813A8D-48DC-407E-BFAC-A1BE06780D0A}"/>
               </a:ext>
             </a:extLst>
           </p:cNvPr>
@@ -8690,8 +8726,8 @@
         </p:blipFill>
         <p:spPr>
           <a:xfrm>
-            <a:off x="1538670" y="1243104"/>
-            <a:ext cx="8554644" cy="5544324"/>
+            <a:off x="1763486" y="1336159"/>
+            <a:ext cx="7834103" cy="5114828"/>
           </a:xfrm>
           <a:prstGeom prst="rect">
             <a:avLst/>
@@ -8701,7 +8737,7 @@
     </p:spTree>
     <p:extLst>
       <p:ext uri="{BB962C8B-B14F-4D97-AF65-F5344CB8AC3E}">
-        <p14:creationId xmlns:p14="http://schemas.microsoft.com/office/powerpoint/2010/main" val="3079365382"/>
+        <p14:creationId xmlns:p14="http://schemas.microsoft.com/office/powerpoint/2010/main" val="1226819991"/>
       </p:ext>
     </p:extLst>
   </p:cSld>
@@ -8828,7 +8864,7 @@
           <p:cNvPr id="2" name="Title 1">
             <a:extLst>
               <a:ext uri="{FF2B5EF4-FFF2-40B4-BE49-F238E27FC236}">
-                <a16:creationId xmlns:a16="http://schemas.microsoft.com/office/drawing/2014/main" id="{B3847317-90A5-4741-AF01-BF5D1FE697D4}"/>
+                <a16:creationId xmlns:a16="http://schemas.microsoft.com/office/drawing/2014/main" id="{2769ED0D-A3C8-4D96-A14D-9E7BAE2C76A5}"/>
               </a:ext>
             </a:extLst>
           </p:cNvPr>
@@ -8839,14 +8875,19 @@
             <p:ph type="title"/>
           </p:nvPr>
         </p:nvSpPr>
-        <p:spPr/>
+        <p:spPr>
+          <a:xfrm>
+            <a:off x="988421" y="172620"/>
+            <a:ext cx="10515600" cy="1325563"/>
+          </a:xfrm>
+        </p:spPr>
         <p:txBody>
           <a:bodyPr/>
           <a:lstStyle/>
           <a:p>
             <a:r>
-              <a:rPr lang="en-US"/>
-              <a:t>K-Fold Cross Validation</a:t>
+              <a:rPr lang="en-US" dirty="0"/>
+              <a:t>Hyperparameter tuning</a:t>
             </a:r>
             <a:endParaRPr lang="en-MY" dirty="0"/>
           </a:p>
@@ -8854,39 +8895,10 @@
       </p:sp>
       <p:sp>
         <p:nvSpPr>
-          <p:cNvPr id="3" name="Text Placeholder 2">
-            <a:extLst>
-              <a:ext uri="{FF2B5EF4-FFF2-40B4-BE49-F238E27FC236}">
-                <a16:creationId xmlns:a16="http://schemas.microsoft.com/office/drawing/2014/main" id="{65C5AE79-B606-4715-9D68-316C7C499902}"/>
-              </a:ext>
-            </a:extLst>
-          </p:cNvPr>
-          <p:cNvSpPr>
-            <a:spLocks noGrp="1"/>
-          </p:cNvSpPr>
-          <p:nvPr>
-            <p:ph type="body" idx="1"/>
-          </p:nvPr>
-        </p:nvSpPr>
-        <p:spPr/>
-        <p:txBody>
-          <a:bodyPr/>
-          <a:lstStyle/>
-          <a:p>
-            <a:r>
-              <a:rPr lang="en-US" dirty="0"/>
-              <a:t>Machine Learning with Python</a:t>
-            </a:r>
-            <a:endParaRPr lang="en-MY" dirty="0"/>
-          </a:p>
-        </p:txBody>
-      </p:sp>
-      <p:sp>
-        <p:nvSpPr>
-          <p:cNvPr id="4" name="Slide Number Placeholder 3">
-            <a:extLst>
-              <a:ext uri="{FF2B5EF4-FFF2-40B4-BE49-F238E27FC236}">
-                <a16:creationId xmlns:a16="http://schemas.microsoft.com/office/drawing/2014/main" id="{14660167-E9A2-4D48-8688-2D6D86B0F698}"/>
+          <p:cNvPr id="3" name="Slide Number Placeholder 2">
+            <a:extLst>
+              <a:ext uri="{FF2B5EF4-FFF2-40B4-BE49-F238E27FC236}">
+                <a16:creationId xmlns:a16="http://schemas.microsoft.com/office/drawing/2014/main" id="{781243E5-8F0B-41FB-8CFC-20BA05B1D544}"/>
               </a:ext>
             </a:extLst>
           </p:cNvPr>
@@ -8910,10 +8922,46 @@
           </a:p>
         </p:txBody>
       </p:sp>
+      <p:pic>
+        <p:nvPicPr>
+          <p:cNvPr id="6" name="Picture 5" descr="A picture containing text, diagram, screenshot, plan&#10;&#10;Description automatically generated">
+            <a:extLst>
+              <a:ext uri="{FF2B5EF4-FFF2-40B4-BE49-F238E27FC236}">
+                <a16:creationId xmlns:a16="http://schemas.microsoft.com/office/drawing/2014/main" id="{06E9887F-9E67-4E7C-98BA-636E711EBB66}"/>
+              </a:ext>
+            </a:extLst>
+          </p:cNvPr>
+          <p:cNvPicPr>
+            <a:picLocks noChangeAspect="1"/>
+          </p:cNvPicPr>
+          <p:nvPr/>
+        </p:nvPicPr>
+        <p:blipFill>
+          <a:blip r:embed="rId2">
+            <a:extLst>
+              <a:ext uri="{28A0092B-C50C-407E-A947-70E740481C1C}">
+                <a14:useLocalDpi xmlns:a14="http://schemas.microsoft.com/office/drawing/2010/main" val="0"/>
+              </a:ext>
+            </a:extLst>
+          </a:blip>
+          <a:stretch>
+            <a:fillRect/>
+          </a:stretch>
+        </p:blipFill>
+        <p:spPr>
+          <a:xfrm>
+            <a:off x="1538670" y="1243104"/>
+            <a:ext cx="8554644" cy="5544324"/>
+          </a:xfrm>
+          <a:prstGeom prst="rect">
+            <a:avLst/>
+          </a:prstGeom>
+        </p:spPr>
+      </p:pic>
     </p:spTree>
     <p:extLst>
       <p:ext uri="{BB962C8B-B14F-4D97-AF65-F5344CB8AC3E}">
-        <p14:creationId xmlns:p14="http://schemas.microsoft.com/office/powerpoint/2010/main" val="4223134121"/>
+        <p14:creationId xmlns:p14="http://schemas.microsoft.com/office/powerpoint/2010/main" val="3079365382"/>
       </p:ext>
     </p:extLst>
   </p:cSld>
@@ -8945,7 +8993,7 @@
           <p:cNvPr id="2" name="Title 1">
             <a:extLst>
               <a:ext uri="{FF2B5EF4-FFF2-40B4-BE49-F238E27FC236}">
-                <a16:creationId xmlns:a16="http://schemas.microsoft.com/office/drawing/2014/main" id="{A0BB95BE-5C40-47AA-9479-CA04D21E0312}"/>
+                <a16:creationId xmlns:a16="http://schemas.microsoft.com/office/drawing/2014/main" id="{B3847317-90A5-4741-AF01-BF5D1FE697D4}"/>
               </a:ext>
             </a:extLst>
           </p:cNvPr>
@@ -8958,14 +9006,41 @@
         </p:nvSpPr>
         <p:spPr/>
         <p:txBody>
-          <a:bodyPr>
-            <a:normAutofit/>
-          </a:bodyPr>
+          <a:bodyPr/>
+          <a:lstStyle/>
+          <a:p>
+            <a:r>
+              <a:rPr lang="en-US"/>
+              <a:t>K-Fold Cross Validation</a:t>
+            </a:r>
+            <a:endParaRPr lang="en-MY" dirty="0"/>
+          </a:p>
+        </p:txBody>
+      </p:sp>
+      <p:sp>
+        <p:nvSpPr>
+          <p:cNvPr id="3" name="Text Placeholder 2">
+            <a:extLst>
+              <a:ext uri="{FF2B5EF4-FFF2-40B4-BE49-F238E27FC236}">
+                <a16:creationId xmlns:a16="http://schemas.microsoft.com/office/drawing/2014/main" id="{65C5AE79-B606-4715-9D68-316C7C499902}"/>
+              </a:ext>
+            </a:extLst>
+          </p:cNvPr>
+          <p:cNvSpPr>
+            <a:spLocks noGrp="1"/>
+          </p:cNvSpPr>
+          <p:nvPr>
+            <p:ph type="body" idx="1"/>
+          </p:nvPr>
+        </p:nvSpPr>
+        <p:spPr/>
+        <p:txBody>
+          <a:bodyPr/>
           <a:lstStyle/>
           <a:p>
             <a:r>
               <a:rPr lang="en-US" dirty="0"/>
-              <a:t>Training and test split </a:t>
+              <a:t>Machine Learning with Python</a:t>
             </a:r>
             <a:endParaRPr lang="en-MY" dirty="0"/>
           </a:p>
@@ -8973,10 +9048,10 @@
       </p:sp>
       <p:sp>
         <p:nvSpPr>
-          <p:cNvPr id="3" name="Slide Number Placeholder 2">
-            <a:extLst>
-              <a:ext uri="{FF2B5EF4-FFF2-40B4-BE49-F238E27FC236}">
-                <a16:creationId xmlns:a16="http://schemas.microsoft.com/office/drawing/2014/main" id="{B09E589D-332D-4DC6-ABCD-B6D60A1E4FEB}"/>
+          <p:cNvPr id="4" name="Slide Number Placeholder 3">
+            <a:extLst>
+              <a:ext uri="{FF2B5EF4-FFF2-40B4-BE49-F238E27FC236}">
+                <a16:creationId xmlns:a16="http://schemas.microsoft.com/office/drawing/2014/main" id="{14660167-E9A2-4D48-8688-2D6D86B0F698}"/>
               </a:ext>
             </a:extLst>
           </p:cNvPr>
@@ -9000,46 +9075,10 @@
           </a:p>
         </p:txBody>
       </p:sp>
-      <p:pic>
-        <p:nvPicPr>
-          <p:cNvPr id="5" name="Picture 4" descr="A picture containing diagram, line, text, screenshot&#10;&#10;Description automatically generated">
-            <a:extLst>
-              <a:ext uri="{FF2B5EF4-FFF2-40B4-BE49-F238E27FC236}">
-                <a16:creationId xmlns:a16="http://schemas.microsoft.com/office/drawing/2014/main" id="{A503943A-0048-4CA8-B4B4-285C1801326A}"/>
-              </a:ext>
-            </a:extLst>
-          </p:cNvPr>
-          <p:cNvPicPr>
-            <a:picLocks noChangeAspect="1"/>
-          </p:cNvPicPr>
-          <p:nvPr/>
-        </p:nvPicPr>
-        <p:blipFill>
-          <a:blip r:embed="rId2">
-            <a:extLst>
-              <a:ext uri="{28A0092B-C50C-407E-A947-70E740481C1C}">
-                <a14:useLocalDpi xmlns:a14="http://schemas.microsoft.com/office/drawing/2010/main" val="0"/>
-              </a:ext>
-            </a:extLst>
-          </a:blip>
-          <a:stretch>
-            <a:fillRect/>
-          </a:stretch>
-        </p:blipFill>
-        <p:spPr>
-          <a:xfrm>
-            <a:off x="1125667" y="2033861"/>
-            <a:ext cx="10280062" cy="3566293"/>
-          </a:xfrm>
-          <a:prstGeom prst="rect">
-            <a:avLst/>
-          </a:prstGeom>
-        </p:spPr>
-      </p:pic>
     </p:spTree>
     <p:extLst>
       <p:ext uri="{BB962C8B-B14F-4D97-AF65-F5344CB8AC3E}">
-        <p14:creationId xmlns:p14="http://schemas.microsoft.com/office/powerpoint/2010/main" val="2293007308"/>
+        <p14:creationId xmlns:p14="http://schemas.microsoft.com/office/powerpoint/2010/main" val="4223134121"/>
       </p:ext>
     </p:extLst>
   </p:cSld>
@@ -9085,13 +9124,13 @@
         <p:spPr/>
         <p:txBody>
           <a:bodyPr>
-            <a:normAutofit fontScale="90000"/>
+            <a:normAutofit/>
           </a:bodyPr>
           <a:lstStyle/>
           <a:p>
             <a:r>
               <a:rPr lang="en-US" dirty="0"/>
-              <a:t>Training, test and validation split </a:t>
+              <a:t>Training and test split </a:t>
             </a:r>
             <a:endParaRPr lang="en-MY" dirty="0"/>
           </a:p>
@@ -9128,10 +9167,10 @@
       </p:sp>
       <p:pic>
         <p:nvPicPr>
-          <p:cNvPr id="4" name="Picture 3">
-            <a:extLst>
-              <a:ext uri="{FF2B5EF4-FFF2-40B4-BE49-F238E27FC236}">
-                <a16:creationId xmlns:a16="http://schemas.microsoft.com/office/drawing/2014/main" id="{962B2667-1388-4CA0-9B71-BE69B0A3E254}"/>
+          <p:cNvPr id="5" name="Picture 4" descr="A picture containing diagram, line, text, screenshot&#10;&#10;Description automatically generated">
+            <a:extLst>
+              <a:ext uri="{FF2B5EF4-FFF2-40B4-BE49-F238E27FC236}">
+                <a16:creationId xmlns:a16="http://schemas.microsoft.com/office/drawing/2014/main" id="{A503943A-0048-4CA8-B4B4-285C1801326A}"/>
               </a:ext>
             </a:extLst>
           </p:cNvPr>
@@ -9154,8 +9193,8 @@
         </p:blipFill>
         <p:spPr>
           <a:xfrm>
-            <a:off x="1604722" y="1581098"/>
-            <a:ext cx="8695173" cy="4884843"/>
+            <a:off x="1125667" y="2033861"/>
+            <a:ext cx="10280062" cy="3566293"/>
           </a:xfrm>
           <a:prstGeom prst="rect">
             <a:avLst/>
@@ -9165,7 +9204,7 @@
     </p:spTree>
     <p:extLst>
       <p:ext uri="{BB962C8B-B14F-4D97-AF65-F5344CB8AC3E}">
-        <p14:creationId xmlns:p14="http://schemas.microsoft.com/office/powerpoint/2010/main" val="502766172"/>
+        <p14:creationId xmlns:p14="http://schemas.microsoft.com/office/powerpoint/2010/main" val="2293007308"/>
       </p:ext>
     </p:extLst>
   </p:cSld>
@@ -9194,10 +9233,41 @@
       </p:grpSpPr>
       <p:sp>
         <p:nvSpPr>
-          <p:cNvPr id="2" name="Slide Number Placeholder 1">
-            <a:extLst>
-              <a:ext uri="{FF2B5EF4-FFF2-40B4-BE49-F238E27FC236}">
-                <a16:creationId xmlns:a16="http://schemas.microsoft.com/office/drawing/2014/main" id="{1519A3CB-7CAD-039E-4D4E-D6BE4A84C589}"/>
+          <p:cNvPr id="2" name="Title 1">
+            <a:extLst>
+              <a:ext uri="{FF2B5EF4-FFF2-40B4-BE49-F238E27FC236}">
+                <a16:creationId xmlns:a16="http://schemas.microsoft.com/office/drawing/2014/main" id="{A0BB95BE-5C40-47AA-9479-CA04D21E0312}"/>
+              </a:ext>
+            </a:extLst>
+          </p:cNvPr>
+          <p:cNvSpPr>
+            <a:spLocks noGrp="1"/>
+          </p:cNvSpPr>
+          <p:nvPr>
+            <p:ph type="title"/>
+          </p:nvPr>
+        </p:nvSpPr>
+        <p:spPr/>
+        <p:txBody>
+          <a:bodyPr>
+            <a:normAutofit fontScale="90000"/>
+          </a:bodyPr>
+          <a:lstStyle/>
+          <a:p>
+            <a:r>
+              <a:rPr lang="en-US" dirty="0"/>
+              <a:t>Training, test and validation split </a:t>
+            </a:r>
+            <a:endParaRPr lang="en-MY" dirty="0"/>
+          </a:p>
+        </p:txBody>
+      </p:sp>
+      <p:sp>
+        <p:nvSpPr>
+          <p:cNvPr id="3" name="Slide Number Placeholder 2">
+            <a:extLst>
+              <a:ext uri="{FF2B5EF4-FFF2-40B4-BE49-F238E27FC236}">
+                <a16:creationId xmlns:a16="http://schemas.microsoft.com/office/drawing/2014/main" id="{B09E589D-332D-4DC6-ABCD-B6D60A1E4FEB}"/>
               </a:ext>
             </a:extLst>
           </p:cNvPr>
@@ -9226,7 +9296,7 @@
           <p:cNvPr id="4" name="Picture 3">
             <a:extLst>
               <a:ext uri="{FF2B5EF4-FFF2-40B4-BE49-F238E27FC236}">
-                <a16:creationId xmlns:a16="http://schemas.microsoft.com/office/drawing/2014/main" id="{35525065-6358-D73C-997B-85A3D65EE875}"/>
+                <a16:creationId xmlns:a16="http://schemas.microsoft.com/office/drawing/2014/main" id="{962B2667-1388-4CA0-9B71-BE69B0A3E254}"/>
               </a:ext>
             </a:extLst>
           </p:cNvPr>
@@ -9249,8 +9319,8 @@
         </p:blipFill>
         <p:spPr>
           <a:xfrm>
-            <a:off x="2158797" y="279238"/>
-            <a:ext cx="7874405" cy="6299524"/>
+            <a:off x="1604722" y="1581098"/>
+            <a:ext cx="8695173" cy="4884843"/>
           </a:xfrm>
           <a:prstGeom prst="rect">
             <a:avLst/>
@@ -9260,7 +9330,7 @@
     </p:spTree>
     <p:extLst>
       <p:ext uri="{BB962C8B-B14F-4D97-AF65-F5344CB8AC3E}">
-        <p14:creationId xmlns:p14="http://schemas.microsoft.com/office/powerpoint/2010/main" val="3269620480"/>
+        <p14:creationId xmlns:p14="http://schemas.microsoft.com/office/powerpoint/2010/main" val="502766172"/>
       </p:ext>
     </p:extLst>
   </p:cSld>
@@ -9289,44 +9359,10 @@
       </p:grpSpPr>
       <p:sp>
         <p:nvSpPr>
-          <p:cNvPr id="2" name="Title 1">
-            <a:extLst>
-              <a:ext uri="{FF2B5EF4-FFF2-40B4-BE49-F238E27FC236}">
-                <a16:creationId xmlns:a16="http://schemas.microsoft.com/office/drawing/2014/main" id="{C0B290E3-C2DC-4098-BE53-7FEC9B4460BF}"/>
-              </a:ext>
-            </a:extLst>
-          </p:cNvPr>
-          <p:cNvSpPr>
-            <a:spLocks noGrp="1"/>
-          </p:cNvSpPr>
-          <p:nvPr>
-            <p:ph type="title"/>
-          </p:nvPr>
-        </p:nvSpPr>
-        <p:spPr>
-          <a:xfrm>
-            <a:off x="838200" y="365125"/>
-            <a:ext cx="10382794" cy="1032601"/>
-          </a:xfrm>
-        </p:spPr>
-        <p:txBody>
-          <a:bodyPr/>
-          <a:lstStyle/>
-          <a:p>
-            <a:r>
-              <a:rPr lang="en-US" dirty="0"/>
-              <a:t>K – fold cross validation</a:t>
-            </a:r>
-            <a:endParaRPr lang="en-MY" dirty="0"/>
-          </a:p>
-        </p:txBody>
-      </p:sp>
-      <p:sp>
-        <p:nvSpPr>
-          <p:cNvPr id="3" name="Slide Number Placeholder 2">
-            <a:extLst>
-              <a:ext uri="{FF2B5EF4-FFF2-40B4-BE49-F238E27FC236}">
-                <a16:creationId xmlns:a16="http://schemas.microsoft.com/office/drawing/2014/main" id="{ACBEDFE4-6C2D-4494-8FC9-719BCAF6B891}"/>
+          <p:cNvPr id="2" name="Slide Number Placeholder 1">
+            <a:extLst>
+              <a:ext uri="{FF2B5EF4-FFF2-40B4-BE49-F238E27FC236}">
+                <a16:creationId xmlns:a16="http://schemas.microsoft.com/office/drawing/2014/main" id="{1519A3CB-7CAD-039E-4D4E-D6BE4A84C589}"/>
               </a:ext>
             </a:extLst>
           </p:cNvPr>
@@ -9352,10 +9388,10 @@
       </p:sp>
       <p:pic>
         <p:nvPicPr>
-          <p:cNvPr id="6" name="Picture 5">
-            <a:extLst>
-              <a:ext uri="{FF2B5EF4-FFF2-40B4-BE49-F238E27FC236}">
-                <a16:creationId xmlns:a16="http://schemas.microsoft.com/office/drawing/2014/main" id="{7F6A5215-BB9A-41EB-941B-79AD03FF640B}"/>
+          <p:cNvPr id="4" name="Picture 3">
+            <a:extLst>
+              <a:ext uri="{FF2B5EF4-FFF2-40B4-BE49-F238E27FC236}">
+                <a16:creationId xmlns:a16="http://schemas.microsoft.com/office/drawing/2014/main" id="{35525065-6358-D73C-997B-85A3D65EE875}"/>
               </a:ext>
             </a:extLst>
           </p:cNvPr>
@@ -9378,8 +9414,8 @@
         </p:blipFill>
         <p:spPr>
           <a:xfrm>
-            <a:off x="2490369" y="1406190"/>
-            <a:ext cx="7923295" cy="5315285"/>
+            <a:off x="2158797" y="279238"/>
+            <a:ext cx="7874405" cy="6299524"/>
           </a:xfrm>
           <a:prstGeom prst="rect">
             <a:avLst/>
@@ -9389,7 +9425,7 @@
     </p:spTree>
     <p:extLst>
       <p:ext uri="{BB962C8B-B14F-4D97-AF65-F5344CB8AC3E}">
-        <p14:creationId xmlns:p14="http://schemas.microsoft.com/office/powerpoint/2010/main" val="4228067176"/>
+        <p14:creationId xmlns:p14="http://schemas.microsoft.com/office/powerpoint/2010/main" val="3269620480"/>
       </p:ext>
     </p:extLst>
   </p:cSld>
@@ -9474,6 +9510,135 @@
             <a:fld id="{1D8ACFD3-EB1D-4FB7-8892-41DABF4B6051}" type="slidenum">
               <a:rPr lang="en-US" smtClean="0"/>
               <a:t>35</a:t>
+            </a:fld>
+            <a:endParaRPr lang="en-US"/>
+          </a:p>
+        </p:txBody>
+      </p:sp>
+      <p:pic>
+        <p:nvPicPr>
+          <p:cNvPr id="6" name="Picture 5">
+            <a:extLst>
+              <a:ext uri="{FF2B5EF4-FFF2-40B4-BE49-F238E27FC236}">
+                <a16:creationId xmlns:a16="http://schemas.microsoft.com/office/drawing/2014/main" id="{7F6A5215-BB9A-41EB-941B-79AD03FF640B}"/>
+              </a:ext>
+            </a:extLst>
+          </p:cNvPr>
+          <p:cNvPicPr>
+            <a:picLocks noChangeAspect="1"/>
+          </p:cNvPicPr>
+          <p:nvPr/>
+        </p:nvPicPr>
+        <p:blipFill>
+          <a:blip r:embed="rId2">
+            <a:extLst>
+              <a:ext uri="{28A0092B-C50C-407E-A947-70E740481C1C}">
+                <a14:useLocalDpi xmlns:a14="http://schemas.microsoft.com/office/drawing/2010/main" val="0"/>
+              </a:ext>
+            </a:extLst>
+          </a:blip>
+          <a:stretch>
+            <a:fillRect/>
+          </a:stretch>
+        </p:blipFill>
+        <p:spPr>
+          <a:xfrm>
+            <a:off x="2490369" y="1406190"/>
+            <a:ext cx="7923295" cy="5315285"/>
+          </a:xfrm>
+          <a:prstGeom prst="rect">
+            <a:avLst/>
+          </a:prstGeom>
+        </p:spPr>
+      </p:pic>
+    </p:spTree>
+    <p:extLst>
+      <p:ext uri="{BB962C8B-B14F-4D97-AF65-F5344CB8AC3E}">
+        <p14:creationId xmlns:p14="http://schemas.microsoft.com/office/powerpoint/2010/main" val="4228067176"/>
+      </p:ext>
+    </p:extLst>
+  </p:cSld>
+  <p:clrMapOvr>
+    <a:masterClrMapping/>
+  </p:clrMapOvr>
+</p:sld>
+</file>
+
+<file path=ppt/slides/slide36.xml><?xml version="1.0" encoding="utf-8"?>
+<p:sld xmlns:a="http://schemas.openxmlformats.org/drawingml/2006/main" xmlns:r="http://schemas.openxmlformats.org/officeDocument/2006/relationships" xmlns:p="http://schemas.openxmlformats.org/presentationml/2006/main">
+  <p:cSld>
+    <p:spTree>
+      <p:nvGrpSpPr>
+        <p:cNvPr id="1" name=""/>
+        <p:cNvGrpSpPr/>
+        <p:nvPr/>
+      </p:nvGrpSpPr>
+      <p:grpSpPr>
+        <a:xfrm>
+          <a:off x="0" y="0"/>
+          <a:ext cx="0" cy="0"/>
+          <a:chOff x="0" y="0"/>
+          <a:chExt cx="0" cy="0"/>
+        </a:xfrm>
+      </p:grpSpPr>
+      <p:sp>
+        <p:nvSpPr>
+          <p:cNvPr id="2" name="Title 1">
+            <a:extLst>
+              <a:ext uri="{FF2B5EF4-FFF2-40B4-BE49-F238E27FC236}">
+                <a16:creationId xmlns:a16="http://schemas.microsoft.com/office/drawing/2014/main" id="{C0B290E3-C2DC-4098-BE53-7FEC9B4460BF}"/>
+              </a:ext>
+            </a:extLst>
+          </p:cNvPr>
+          <p:cNvSpPr>
+            <a:spLocks noGrp="1"/>
+          </p:cNvSpPr>
+          <p:nvPr>
+            <p:ph type="title"/>
+          </p:nvPr>
+        </p:nvSpPr>
+        <p:spPr>
+          <a:xfrm>
+            <a:off x="838200" y="365125"/>
+            <a:ext cx="10382794" cy="1032601"/>
+          </a:xfrm>
+        </p:spPr>
+        <p:txBody>
+          <a:bodyPr/>
+          <a:lstStyle/>
+          <a:p>
+            <a:r>
+              <a:rPr lang="en-US" dirty="0"/>
+              <a:t>K – fold cross validation</a:t>
+            </a:r>
+            <a:endParaRPr lang="en-MY" dirty="0"/>
+          </a:p>
+        </p:txBody>
+      </p:sp>
+      <p:sp>
+        <p:nvSpPr>
+          <p:cNvPr id="3" name="Slide Number Placeholder 2">
+            <a:extLst>
+              <a:ext uri="{FF2B5EF4-FFF2-40B4-BE49-F238E27FC236}">
+                <a16:creationId xmlns:a16="http://schemas.microsoft.com/office/drawing/2014/main" id="{ACBEDFE4-6C2D-4494-8FC9-719BCAF6B891}"/>
+              </a:ext>
+            </a:extLst>
+          </p:cNvPr>
+          <p:cNvSpPr>
+            <a:spLocks noGrp="1"/>
+          </p:cNvSpPr>
+          <p:nvPr>
+            <p:ph type="sldNum" sz="quarter" idx="12"/>
+          </p:nvPr>
+        </p:nvSpPr>
+        <p:spPr/>
+        <p:txBody>
+          <a:bodyPr/>
+          <a:lstStyle/>
+          <a:p>
+            <a:fld id="{1D8ACFD3-EB1D-4FB7-8892-41DABF4B6051}" type="slidenum">
+              <a:rPr lang="en-US" smtClean="0"/>
+              <a:t>36</a:t>
             </a:fld>
             <a:endParaRPr lang="en-US"/>
           </a:p>

</xml_diff>